<commit_message>
maj version spring boot 3.3.3
</commit_message>
<xml_diff>
--- a/REACTIVE.pptx
+++ b/REACTIVE.pptx
@@ -5,10 +5,10 @@
     <p:sldMasterId id="2147483715" r:id="rId4"/>
   </p:sldMasterIdLst>
   <p:notesMasterIdLst>
-    <p:notesMasterId r:id="rId27"/>
+    <p:notesMasterId r:id="rId32"/>
   </p:notesMasterIdLst>
   <p:handoutMasterIdLst>
-    <p:handoutMasterId r:id="rId28"/>
+    <p:handoutMasterId r:id="rId33"/>
   </p:handoutMasterIdLst>
   <p:sldIdLst>
     <p:sldId id="256" r:id="rId5"/>
@@ -23,16 +23,21 @@
     <p:sldId id="361" r:id="rId14"/>
     <p:sldId id="362" r:id="rId15"/>
     <p:sldId id="364" r:id="rId16"/>
-    <p:sldId id="348" r:id="rId17"/>
-    <p:sldId id="350" r:id="rId18"/>
-    <p:sldId id="355" r:id="rId19"/>
-    <p:sldId id="349" r:id="rId20"/>
-    <p:sldId id="352" r:id="rId21"/>
-    <p:sldId id="347" r:id="rId22"/>
-    <p:sldId id="353" r:id="rId23"/>
-    <p:sldId id="346" r:id="rId24"/>
-    <p:sldId id="354" r:id="rId25"/>
-    <p:sldId id="327" r:id="rId26"/>
+    <p:sldId id="370" r:id="rId17"/>
+    <p:sldId id="371" r:id="rId18"/>
+    <p:sldId id="367" r:id="rId19"/>
+    <p:sldId id="368" r:id="rId20"/>
+    <p:sldId id="369" r:id="rId21"/>
+    <p:sldId id="348" r:id="rId22"/>
+    <p:sldId id="350" r:id="rId23"/>
+    <p:sldId id="355" r:id="rId24"/>
+    <p:sldId id="349" r:id="rId25"/>
+    <p:sldId id="352" r:id="rId26"/>
+    <p:sldId id="347" r:id="rId27"/>
+    <p:sldId id="353" r:id="rId28"/>
+    <p:sldId id="346" r:id="rId29"/>
+    <p:sldId id="354" r:id="rId30"/>
+    <p:sldId id="327" r:id="rId31"/>
   </p:sldIdLst>
   <p:sldSz cx="12192000" cy="6858000"/>
   <p:notesSz cx="6858000" cy="9144000"/>
@@ -148,6 +153,11 @@
             <p14:sldId id="361"/>
             <p14:sldId id="362"/>
             <p14:sldId id="364"/>
+            <p14:sldId id="370"/>
+            <p14:sldId id="371"/>
+            <p14:sldId id="367"/>
+            <p14:sldId id="368"/>
+            <p14:sldId id="369"/>
             <p14:sldId id="348"/>
             <p14:sldId id="350"/>
             <p14:sldId id="355"/>
@@ -273,7 +283,7 @@
             <a:pPr rtl="0"/>
             <a:fld id="{3C80F580-3B6A-44CD-9A1E-E890016126F8}" type="datetime1">
               <a:rPr lang="fr-FR" smtClean="0"/>
-              <a:t>27/11/2023</a:t>
+              <a:t>30/08/2024</a:t>
             </a:fld>
             <a:endParaRPr lang="fr-FR"/>
           </a:p>
@@ -443,7 +453,7 @@
             <a:pPr rtl="0"/>
             <a:fld id="{7DF8ED89-FBF4-48E3-B6C6-C071DA98F802}" type="datetime1">
               <a:rPr lang="fr-FR" noProof="1" dirty="0" smtClean="0"/>
-              <a:t>27/11/2023</a:t>
+              <a:t>30/08/2024</a:t>
             </a:fld>
             <a:endParaRPr lang="fr-FR" noProof="1"/>
           </a:p>
@@ -1136,7 +1146,7 @@
             <a:pPr rtl="0"/>
             <a:fld id="{DF61EA0F-A667-4B49-8422-0062BC55E249}" type="slidenum">
               <a:rPr lang="fr-FR" noProof="1" smtClean="0"/>
-              <a:t>13</a:t>
+              <a:t>18</a:t>
             </a:fld>
             <a:endParaRPr lang="fr-FR" noProof="1"/>
           </a:p>
@@ -1221,7 +1231,7 @@
             <a:pPr rtl="0"/>
             <a:fld id="{DF61EA0F-A667-4B49-8422-0062BC55E249}" type="slidenum">
               <a:rPr lang="fr-FR" noProof="1" dirty="0" smtClean="0"/>
-              <a:t>15</a:t>
+              <a:t>20</a:t>
             </a:fld>
             <a:endParaRPr lang="fr-FR" noProof="1"/>
           </a:p>
@@ -1306,7 +1316,7 @@
             <a:pPr rtl="0"/>
             <a:fld id="{DF61EA0F-A667-4B49-8422-0062BC55E249}" type="slidenum">
               <a:rPr lang="fr-FR" noProof="1" dirty="0" smtClean="0"/>
-              <a:t>17</a:t>
+              <a:t>22</a:t>
             </a:fld>
             <a:endParaRPr lang="fr-FR" noProof="1"/>
           </a:p>
@@ -1391,7 +1401,7 @@
             <a:pPr rtl="0"/>
             <a:fld id="{DF61EA0F-A667-4B49-8422-0062BC55E249}" type="slidenum">
               <a:rPr lang="fr-FR" noProof="1" dirty="0" smtClean="0"/>
-              <a:t>19</a:t>
+              <a:t>24</a:t>
             </a:fld>
             <a:endParaRPr lang="fr-FR" noProof="1"/>
           </a:p>
@@ -1476,7 +1486,7 @@
             <a:pPr rtl="0"/>
             <a:fld id="{DF61EA0F-A667-4B49-8422-0062BC55E249}" type="slidenum">
               <a:rPr lang="fr-FR" noProof="1" dirty="0" smtClean="0"/>
-              <a:t>21</a:t>
+              <a:t>26</a:t>
             </a:fld>
             <a:endParaRPr lang="fr-FR" noProof="1"/>
           </a:p>
@@ -1561,7 +1571,7 @@
             <a:pPr rtl="0"/>
             <a:fld id="{DF61EA0F-A667-4B49-8422-0062BC55E249}" type="slidenum">
               <a:rPr lang="fr-FR" noProof="1" dirty="0" smtClean="0"/>
-              <a:t>22</a:t>
+              <a:t>27</a:t>
             </a:fld>
             <a:endParaRPr lang="fr-FR" noProof="1"/>
           </a:p>
@@ -2419,7 +2429,7 @@
             <a:pPr rtl="0"/>
             <a:fld id="{802CD4F2-526B-4131-B91B-856C46007FC5}" type="datetime1">
               <a:rPr lang="fr-FR" noProof="0" smtClean="0"/>
-              <a:t>27/11/2023</a:t>
+              <a:t>30/08/2024</a:t>
             </a:fld>
             <a:endParaRPr lang="fr-FR" noProof="0"/>
           </a:p>
@@ -2622,7 +2632,7 @@
             <a:pPr rtl="0"/>
             <a:fld id="{802CD4F2-526B-4131-B91B-856C46007FC5}" type="datetime1">
               <a:rPr lang="fr-FR" noProof="0" smtClean="0"/>
-              <a:t>27/11/2023</a:t>
+              <a:t>30/08/2024</a:t>
             </a:fld>
             <a:endParaRPr lang="fr-FR" noProof="0"/>
           </a:p>
@@ -2835,7 +2845,7 @@
             <a:pPr rtl="0"/>
             <a:fld id="{802CD4F2-526B-4131-B91B-856C46007FC5}" type="datetime1">
               <a:rPr lang="fr-FR" noProof="0" smtClean="0"/>
-              <a:t>27/11/2023</a:t>
+              <a:t>30/08/2024</a:t>
             </a:fld>
             <a:endParaRPr lang="fr-FR" noProof="0"/>
           </a:p>
@@ -3350,7 +3360,7 @@
             <a:pPr rtl="0"/>
             <a:fld id="{7DF3CA4B-903E-431D-AF93-2AD02E04DE8A}" type="datetime1">
               <a:rPr lang="fr-FR" noProof="0" smtClean="0"/>
-              <a:t>27/11/2023</a:t>
+              <a:t>30/08/2024</a:t>
             </a:fld>
             <a:endParaRPr lang="fr-FR" noProof="0"/>
           </a:p>
@@ -3903,7 +3913,7 @@
             <a:pPr rtl="0"/>
             <a:fld id="{802CD4F2-526B-4131-B91B-856C46007FC5}" type="datetime1">
               <a:rPr lang="fr-FR" noProof="0" smtClean="0"/>
-              <a:t>27/11/2023</a:t>
+              <a:t>30/08/2024</a:t>
             </a:fld>
             <a:endParaRPr lang="fr-FR" noProof="0"/>
           </a:p>
@@ -4183,7 +4193,7 @@
             <a:pPr rtl="0"/>
             <a:fld id="{802CD4F2-526B-4131-B91B-856C46007FC5}" type="datetime1">
               <a:rPr lang="fr-FR" noProof="0" smtClean="0"/>
-              <a:t>27/11/2023</a:t>
+              <a:t>30/08/2024</a:t>
             </a:fld>
             <a:endParaRPr lang="fr-FR" noProof="0"/>
           </a:p>
@@ -4453,7 +4463,7 @@
             <a:pPr rtl="0"/>
             <a:fld id="{802CD4F2-526B-4131-B91B-856C46007FC5}" type="datetime1">
               <a:rPr lang="fr-FR" noProof="0" smtClean="0"/>
-              <a:t>27/11/2023</a:t>
+              <a:t>30/08/2024</a:t>
             </a:fld>
             <a:endParaRPr lang="fr-FR" noProof="0"/>
           </a:p>
@@ -4870,7 +4880,7 @@
             <a:pPr rtl="0"/>
             <a:fld id="{802CD4F2-526B-4131-B91B-856C46007FC5}" type="datetime1">
               <a:rPr lang="fr-FR" noProof="0" smtClean="0"/>
-              <a:t>27/11/2023</a:t>
+              <a:t>30/08/2024</a:t>
             </a:fld>
             <a:endParaRPr lang="fr-FR" noProof="0"/>
           </a:p>
@@ -5016,7 +5026,7 @@
             <a:pPr rtl="0"/>
             <a:fld id="{802CD4F2-526B-4131-B91B-856C46007FC5}" type="datetime1">
               <a:rPr lang="fr-FR" noProof="0" smtClean="0"/>
-              <a:t>27/11/2023</a:t>
+              <a:t>30/08/2024</a:t>
             </a:fld>
             <a:endParaRPr lang="fr-FR" noProof="0"/>
           </a:p>
@@ -5134,7 +5144,7 @@
             <a:pPr rtl="0"/>
             <a:fld id="{802CD4F2-526B-4131-B91B-856C46007FC5}" type="datetime1">
               <a:rPr lang="fr-FR" noProof="0" smtClean="0"/>
-              <a:t>27/11/2023</a:t>
+              <a:t>30/08/2024</a:t>
             </a:fld>
             <a:endParaRPr lang="fr-FR" noProof="0"/>
           </a:p>
@@ -5450,7 +5460,7 @@
             <a:pPr rtl="0"/>
             <a:fld id="{802CD4F2-526B-4131-B91B-856C46007FC5}" type="datetime1">
               <a:rPr lang="fr-FR" noProof="0" smtClean="0"/>
-              <a:t>27/11/2023</a:t>
+              <a:t>30/08/2024</a:t>
             </a:fld>
             <a:endParaRPr lang="fr-FR" noProof="0"/>
           </a:p>
@@ -5743,7 +5753,7 @@
             <a:pPr rtl="0"/>
             <a:fld id="{802CD4F2-526B-4131-B91B-856C46007FC5}" type="datetime1">
               <a:rPr lang="fr-FR" noProof="0" smtClean="0"/>
-              <a:t>27/11/2023</a:t>
+              <a:t>30/08/2024</a:t>
             </a:fld>
             <a:endParaRPr lang="fr-FR" noProof="0"/>
           </a:p>
@@ -5989,7 +5999,7 @@
             <a:pPr rtl="0"/>
             <a:fld id="{802CD4F2-526B-4131-B91B-856C46007FC5}" type="datetime1">
               <a:rPr lang="fr-FR" noProof="0" smtClean="0"/>
-              <a:t>27/11/2023</a:t>
+              <a:t>30/08/2024</a:t>
             </a:fld>
             <a:endParaRPr lang="fr-FR" noProof="0"/>
           </a:p>
@@ -8693,6 +8703,488 @@
           <p:cNvPr id="2" name="Titre 1">
             <a:extLst>
               <a:ext uri="{FF2B5EF4-FFF2-40B4-BE49-F238E27FC236}">
+                <a16:creationId xmlns:a16="http://schemas.microsoft.com/office/drawing/2014/main" id="{28155282-0AF2-87F5-2598-40DBE664613B}"/>
+              </a:ext>
+            </a:extLst>
+          </p:cNvPr>
+          <p:cNvSpPr>
+            <a:spLocks noGrp="1"/>
+          </p:cNvSpPr>
+          <p:nvPr>
+            <p:ph type="title"/>
+          </p:nvPr>
+        </p:nvSpPr>
+        <p:spPr/>
+        <p:txBody>
+          <a:bodyPr/>
+          <a:lstStyle/>
+          <a:p>
+            <a:endParaRPr lang="fr-FR"/>
+          </a:p>
+        </p:txBody>
+      </p:sp>
+      <p:pic>
+        <p:nvPicPr>
+          <p:cNvPr id="15" name="Image 14" descr="Une image contenant texte, capture d’écran, Police, nombre&#10;&#10;Description générée automatiquement">
+            <a:extLst>
+              <a:ext uri="{FF2B5EF4-FFF2-40B4-BE49-F238E27FC236}">
+                <a16:creationId xmlns:a16="http://schemas.microsoft.com/office/drawing/2014/main" id="{ABA9B486-D1F0-39B9-5234-26F870D6B29B}"/>
+              </a:ext>
+            </a:extLst>
+          </p:cNvPr>
+          <p:cNvPicPr>
+            <a:picLocks noChangeAspect="1"/>
+          </p:cNvPicPr>
+          <p:nvPr/>
+        </p:nvPicPr>
+        <p:blipFill>
+          <a:blip r:embed="rId2"/>
+          <a:stretch>
+            <a:fillRect/>
+          </a:stretch>
+        </p:blipFill>
+        <p:spPr>
+          <a:xfrm>
+            <a:off x="0" y="681699"/>
+            <a:ext cx="12192000" cy="5494601"/>
+          </a:xfrm>
+          <a:prstGeom prst="rect">
+            <a:avLst/>
+          </a:prstGeom>
+        </p:spPr>
+      </p:pic>
+    </p:spTree>
+    <p:extLst>
+      <p:ext uri="{BB962C8B-B14F-4D97-AF65-F5344CB8AC3E}">
+        <p14:creationId xmlns:p14="http://schemas.microsoft.com/office/powerpoint/2010/main" val="2967615073"/>
+      </p:ext>
+    </p:extLst>
+  </p:cSld>
+  <p:clrMapOvr>
+    <a:masterClrMapping/>
+  </p:clrMapOvr>
+</p:sld>
+</file>
+
+<file path=ppt/slides/slide14.xml><?xml version="1.0" encoding="utf-8"?>
+<p:sld xmlns:a="http://schemas.openxmlformats.org/drawingml/2006/main" xmlns:r="http://schemas.openxmlformats.org/officeDocument/2006/relationships" xmlns:p="http://schemas.openxmlformats.org/presentationml/2006/main">
+  <p:cSld>
+    <p:spTree>
+      <p:nvGrpSpPr>
+        <p:cNvPr id="1" name=""/>
+        <p:cNvGrpSpPr/>
+        <p:nvPr/>
+      </p:nvGrpSpPr>
+      <p:grpSpPr>
+        <a:xfrm>
+          <a:off x="0" y="0"/>
+          <a:ext cx="0" cy="0"/>
+          <a:chOff x="0" y="0"/>
+          <a:chExt cx="0" cy="0"/>
+        </a:xfrm>
+      </p:grpSpPr>
+      <p:sp>
+        <p:nvSpPr>
+          <p:cNvPr id="2" name="Titre 1">
+            <a:extLst>
+              <a:ext uri="{FF2B5EF4-FFF2-40B4-BE49-F238E27FC236}">
+                <a16:creationId xmlns:a16="http://schemas.microsoft.com/office/drawing/2014/main" id="{258206FC-B90A-322A-DFEE-40088F61DBDB}"/>
+              </a:ext>
+            </a:extLst>
+          </p:cNvPr>
+          <p:cNvSpPr>
+            <a:spLocks noGrp="1"/>
+          </p:cNvSpPr>
+          <p:nvPr>
+            <p:ph type="title"/>
+          </p:nvPr>
+        </p:nvSpPr>
+        <p:spPr/>
+        <p:txBody>
+          <a:bodyPr/>
+          <a:lstStyle/>
+          <a:p>
+            <a:endParaRPr lang="fr-FR"/>
+          </a:p>
+        </p:txBody>
+      </p:sp>
+      <p:pic>
+        <p:nvPicPr>
+          <p:cNvPr id="9" name="Image 8" descr="Une image contenant texte, capture d’écran, Police, nombre&#10;&#10;Description générée automatiquement">
+            <a:extLst>
+              <a:ext uri="{FF2B5EF4-FFF2-40B4-BE49-F238E27FC236}">
+                <a16:creationId xmlns:a16="http://schemas.microsoft.com/office/drawing/2014/main" id="{25EA43ED-CA81-85C7-9431-A0B51D049D58}"/>
+              </a:ext>
+            </a:extLst>
+          </p:cNvPr>
+          <p:cNvPicPr>
+            <a:picLocks noChangeAspect="1"/>
+          </p:cNvPicPr>
+          <p:nvPr/>
+        </p:nvPicPr>
+        <p:blipFill>
+          <a:blip r:embed="rId2"/>
+          <a:stretch>
+            <a:fillRect/>
+          </a:stretch>
+        </p:blipFill>
+        <p:spPr>
+          <a:xfrm>
+            <a:off x="0" y="453489"/>
+            <a:ext cx="12192000" cy="5951022"/>
+          </a:xfrm>
+          <a:prstGeom prst="rect">
+            <a:avLst/>
+          </a:prstGeom>
+        </p:spPr>
+      </p:pic>
+    </p:spTree>
+    <p:extLst>
+      <p:ext uri="{BB962C8B-B14F-4D97-AF65-F5344CB8AC3E}">
+        <p14:creationId xmlns:p14="http://schemas.microsoft.com/office/powerpoint/2010/main" val="860644961"/>
+      </p:ext>
+    </p:extLst>
+  </p:cSld>
+  <p:clrMapOvr>
+    <a:masterClrMapping/>
+  </p:clrMapOvr>
+</p:sld>
+</file>
+
+<file path=ppt/slides/slide15.xml><?xml version="1.0" encoding="utf-8"?>
+<p:sld xmlns:a="http://schemas.openxmlformats.org/drawingml/2006/main" xmlns:r="http://schemas.openxmlformats.org/officeDocument/2006/relationships" xmlns:p="http://schemas.openxmlformats.org/presentationml/2006/main">
+  <p:cSld>
+    <p:spTree>
+      <p:nvGrpSpPr>
+        <p:cNvPr id="1" name=""/>
+        <p:cNvGrpSpPr/>
+        <p:nvPr/>
+      </p:nvGrpSpPr>
+      <p:grpSpPr>
+        <a:xfrm>
+          <a:off x="0" y="0"/>
+          <a:ext cx="0" cy="0"/>
+          <a:chOff x="0" y="0"/>
+          <a:chExt cx="0" cy="0"/>
+        </a:xfrm>
+      </p:grpSpPr>
+      <p:sp>
+        <p:nvSpPr>
+          <p:cNvPr id="2" name="Titre 1">
+            <a:extLst>
+              <a:ext uri="{FF2B5EF4-FFF2-40B4-BE49-F238E27FC236}">
+                <a16:creationId xmlns:a16="http://schemas.microsoft.com/office/drawing/2014/main" id="{322CB465-D032-6320-94C8-9E6E05FD6B2C}"/>
+              </a:ext>
+            </a:extLst>
+          </p:cNvPr>
+          <p:cNvSpPr>
+            <a:spLocks noGrp="1"/>
+          </p:cNvSpPr>
+          <p:nvPr>
+            <p:ph type="title"/>
+          </p:nvPr>
+        </p:nvSpPr>
+        <p:spPr/>
+        <p:txBody>
+          <a:bodyPr/>
+          <a:lstStyle/>
+          <a:p>
+            <a:endParaRPr lang="fr-FR"/>
+          </a:p>
+        </p:txBody>
+      </p:sp>
+      <p:pic>
+        <p:nvPicPr>
+          <p:cNvPr id="5" name="Espace réservé du contenu 4" descr="Une image contenant texte, capture d’écran, affichage, diagramme&#10;&#10;Description générée automatiquement">
+            <a:extLst>
+              <a:ext uri="{FF2B5EF4-FFF2-40B4-BE49-F238E27FC236}">
+                <a16:creationId xmlns:a16="http://schemas.microsoft.com/office/drawing/2014/main" id="{CE9509FB-9D35-44E2-BABE-E77D3B80BC31}"/>
+              </a:ext>
+            </a:extLst>
+          </p:cNvPr>
+          <p:cNvPicPr>
+            <a:picLocks noGrp="1" noChangeAspect="1"/>
+          </p:cNvPicPr>
+          <p:nvPr>
+            <p:ph sz="quarter" idx="10"/>
+          </p:nvPr>
+        </p:nvPicPr>
+        <p:blipFill>
+          <a:blip r:embed="rId2"/>
+          <a:stretch>
+            <a:fillRect/>
+          </a:stretch>
+        </p:blipFill>
+        <p:spPr>
+          <a:xfrm>
+            <a:off x="539750" y="1441353"/>
+            <a:ext cx="4416425" cy="3965769"/>
+          </a:xfrm>
+        </p:spPr>
+      </p:pic>
+      <p:pic>
+        <p:nvPicPr>
+          <p:cNvPr id="9" name="Image 8" descr="Une image contenant texte, capture d’écran, diagramme, nombre&#10;&#10;Description générée automatiquement">
+            <a:extLst>
+              <a:ext uri="{FF2B5EF4-FFF2-40B4-BE49-F238E27FC236}">
+                <a16:creationId xmlns:a16="http://schemas.microsoft.com/office/drawing/2014/main" id="{DDD4DCD3-3C59-A542-32DE-3C4D64118C8E}"/>
+              </a:ext>
+            </a:extLst>
+          </p:cNvPr>
+          <p:cNvPicPr>
+            <a:picLocks noChangeAspect="1"/>
+          </p:cNvPicPr>
+          <p:nvPr/>
+        </p:nvPicPr>
+        <p:blipFill>
+          <a:blip r:embed="rId3"/>
+          <a:stretch>
+            <a:fillRect/>
+          </a:stretch>
+        </p:blipFill>
+        <p:spPr>
+          <a:xfrm>
+            <a:off x="4648478" y="1547812"/>
+            <a:ext cx="7086600" cy="3752850"/>
+          </a:xfrm>
+          <a:prstGeom prst="rect">
+            <a:avLst/>
+          </a:prstGeom>
+        </p:spPr>
+      </p:pic>
+    </p:spTree>
+    <p:extLst>
+      <p:ext uri="{BB962C8B-B14F-4D97-AF65-F5344CB8AC3E}">
+        <p14:creationId xmlns:p14="http://schemas.microsoft.com/office/powerpoint/2010/main" val="1714217400"/>
+      </p:ext>
+    </p:extLst>
+  </p:cSld>
+  <p:clrMapOvr>
+    <a:masterClrMapping/>
+  </p:clrMapOvr>
+</p:sld>
+</file>
+
+<file path=ppt/slides/slide16.xml><?xml version="1.0" encoding="utf-8"?>
+<p:sld xmlns:a="http://schemas.openxmlformats.org/drawingml/2006/main" xmlns:r="http://schemas.openxmlformats.org/officeDocument/2006/relationships" xmlns:p="http://schemas.openxmlformats.org/presentationml/2006/main">
+  <p:cSld>
+    <p:spTree>
+      <p:nvGrpSpPr>
+        <p:cNvPr id="1" name=""/>
+        <p:cNvGrpSpPr/>
+        <p:nvPr/>
+      </p:nvGrpSpPr>
+      <p:grpSpPr>
+        <a:xfrm>
+          <a:off x="0" y="0"/>
+          <a:ext cx="0" cy="0"/>
+          <a:chOff x="0" y="0"/>
+          <a:chExt cx="0" cy="0"/>
+        </a:xfrm>
+      </p:grpSpPr>
+      <p:sp>
+        <p:nvSpPr>
+          <p:cNvPr id="2" name="Titre 1">
+            <a:extLst>
+              <a:ext uri="{FF2B5EF4-FFF2-40B4-BE49-F238E27FC236}">
+                <a16:creationId xmlns:a16="http://schemas.microsoft.com/office/drawing/2014/main" id="{E689CF0D-856A-CEAD-A6F9-D27C34C93E8C}"/>
+              </a:ext>
+            </a:extLst>
+          </p:cNvPr>
+          <p:cNvSpPr>
+            <a:spLocks noGrp="1"/>
+          </p:cNvSpPr>
+          <p:nvPr>
+            <p:ph type="title"/>
+          </p:nvPr>
+        </p:nvSpPr>
+        <p:spPr/>
+        <p:txBody>
+          <a:bodyPr/>
+          <a:lstStyle/>
+          <a:p>
+            <a:endParaRPr lang="fr-FR"/>
+          </a:p>
+        </p:txBody>
+      </p:sp>
+      <p:pic>
+        <p:nvPicPr>
+          <p:cNvPr id="5" name="Espace réservé du contenu 4" descr="Une image contenant texte, capture d’écran, ligne, Parallèle&#10;&#10;Description générée automatiquement">
+            <a:extLst>
+              <a:ext uri="{FF2B5EF4-FFF2-40B4-BE49-F238E27FC236}">
+                <a16:creationId xmlns:a16="http://schemas.microsoft.com/office/drawing/2014/main" id="{FCB230CD-2A26-8B37-F138-D114645F1F0C}"/>
+              </a:ext>
+            </a:extLst>
+          </p:cNvPr>
+          <p:cNvPicPr>
+            <a:picLocks noGrp="1" noChangeAspect="1"/>
+          </p:cNvPicPr>
+          <p:nvPr>
+            <p:ph sz="quarter" idx="10"/>
+          </p:nvPr>
+        </p:nvPicPr>
+        <p:blipFill>
+          <a:blip r:embed="rId2"/>
+          <a:stretch>
+            <a:fillRect/>
+          </a:stretch>
+        </p:blipFill>
+        <p:spPr>
+          <a:xfrm>
+            <a:off x="539750" y="2353254"/>
+            <a:ext cx="4416425" cy="2141966"/>
+          </a:xfrm>
+        </p:spPr>
+      </p:pic>
+      <p:pic>
+        <p:nvPicPr>
+          <p:cNvPr id="7" name="Image 6" descr="Une image contenant texte, diagramme, capture d’écran, Plan&#10;&#10;Description générée automatiquement">
+            <a:extLst>
+              <a:ext uri="{FF2B5EF4-FFF2-40B4-BE49-F238E27FC236}">
+                <a16:creationId xmlns:a16="http://schemas.microsoft.com/office/drawing/2014/main" id="{2DF949AF-6520-286C-4113-84716C6F91FD}"/>
+              </a:ext>
+            </a:extLst>
+          </p:cNvPr>
+          <p:cNvPicPr>
+            <a:picLocks noChangeAspect="1"/>
+          </p:cNvPicPr>
+          <p:nvPr/>
+        </p:nvPicPr>
+        <p:blipFill>
+          <a:blip r:embed="rId3"/>
+          <a:stretch>
+            <a:fillRect/>
+          </a:stretch>
+        </p:blipFill>
+        <p:spPr>
+          <a:xfrm>
+            <a:off x="1522958" y="1066261"/>
+            <a:ext cx="9146084" cy="4725477"/>
+          </a:xfrm>
+          <a:prstGeom prst="rect">
+            <a:avLst/>
+          </a:prstGeom>
+        </p:spPr>
+      </p:pic>
+    </p:spTree>
+    <p:extLst>
+      <p:ext uri="{BB962C8B-B14F-4D97-AF65-F5344CB8AC3E}">
+        <p14:creationId xmlns:p14="http://schemas.microsoft.com/office/powerpoint/2010/main" val="2840058698"/>
+      </p:ext>
+    </p:extLst>
+  </p:cSld>
+  <p:clrMapOvr>
+    <a:masterClrMapping/>
+  </p:clrMapOvr>
+</p:sld>
+</file>
+
+<file path=ppt/slides/slide17.xml><?xml version="1.0" encoding="utf-8"?>
+<p:sld xmlns:a="http://schemas.openxmlformats.org/drawingml/2006/main" xmlns:r="http://schemas.openxmlformats.org/officeDocument/2006/relationships" xmlns:p="http://schemas.openxmlformats.org/presentationml/2006/main">
+  <p:cSld>
+    <p:spTree>
+      <p:nvGrpSpPr>
+        <p:cNvPr id="1" name=""/>
+        <p:cNvGrpSpPr/>
+        <p:nvPr/>
+      </p:nvGrpSpPr>
+      <p:grpSpPr>
+        <a:xfrm>
+          <a:off x="0" y="0"/>
+          <a:ext cx="0" cy="0"/>
+          <a:chOff x="0" y="0"/>
+          <a:chExt cx="0" cy="0"/>
+        </a:xfrm>
+      </p:grpSpPr>
+      <p:sp>
+        <p:nvSpPr>
+          <p:cNvPr id="2" name="Titre 1">
+            <a:extLst>
+              <a:ext uri="{FF2B5EF4-FFF2-40B4-BE49-F238E27FC236}">
+                <a16:creationId xmlns:a16="http://schemas.microsoft.com/office/drawing/2014/main" id="{BBE1B255-BB70-C8F9-B852-3F4521ED922F}"/>
+              </a:ext>
+            </a:extLst>
+          </p:cNvPr>
+          <p:cNvSpPr>
+            <a:spLocks noGrp="1"/>
+          </p:cNvSpPr>
+          <p:nvPr>
+            <p:ph type="title"/>
+          </p:nvPr>
+        </p:nvSpPr>
+        <p:spPr/>
+        <p:txBody>
+          <a:bodyPr/>
+          <a:lstStyle/>
+          <a:p>
+            <a:endParaRPr lang="fr-FR"/>
+          </a:p>
+        </p:txBody>
+      </p:sp>
+      <p:pic>
+        <p:nvPicPr>
+          <p:cNvPr id="5" name="Espace réservé du contenu 4" descr="Une image contenant texte, diagramme, Plan, capture d’écran&#10;&#10;Description générée automatiquement">
+            <a:extLst>
+              <a:ext uri="{FF2B5EF4-FFF2-40B4-BE49-F238E27FC236}">
+                <a16:creationId xmlns:a16="http://schemas.microsoft.com/office/drawing/2014/main" id="{25C3EBC4-CE2E-2088-9C0B-982D74BDBB43}"/>
+              </a:ext>
+            </a:extLst>
+          </p:cNvPr>
+          <p:cNvPicPr>
+            <a:picLocks noGrp="1" noChangeAspect="1"/>
+          </p:cNvPicPr>
+          <p:nvPr>
+            <p:ph sz="quarter" idx="10"/>
+          </p:nvPr>
+        </p:nvPicPr>
+        <p:blipFill>
+          <a:blip r:embed="rId2"/>
+          <a:stretch>
+            <a:fillRect/>
+          </a:stretch>
+        </p:blipFill>
+        <p:spPr>
+          <a:xfrm>
+            <a:off x="539750" y="2065573"/>
+            <a:ext cx="4416425" cy="2717328"/>
+          </a:xfrm>
+        </p:spPr>
+      </p:pic>
+    </p:spTree>
+    <p:extLst>
+      <p:ext uri="{BB962C8B-B14F-4D97-AF65-F5344CB8AC3E}">
+        <p14:creationId xmlns:p14="http://schemas.microsoft.com/office/powerpoint/2010/main" val="3019524420"/>
+      </p:ext>
+    </p:extLst>
+  </p:cSld>
+  <p:clrMapOvr>
+    <a:masterClrMapping/>
+  </p:clrMapOvr>
+</p:sld>
+</file>
+
+<file path=ppt/slides/slide18.xml><?xml version="1.0" encoding="utf-8"?>
+<p:sld xmlns:a="http://schemas.openxmlformats.org/drawingml/2006/main" xmlns:r="http://schemas.openxmlformats.org/officeDocument/2006/relationships" xmlns:p="http://schemas.openxmlformats.org/presentationml/2006/main">
+  <p:cSld>
+    <p:spTree>
+      <p:nvGrpSpPr>
+        <p:cNvPr id="1" name=""/>
+        <p:cNvGrpSpPr/>
+        <p:nvPr/>
+      </p:nvGrpSpPr>
+      <p:grpSpPr>
+        <a:xfrm>
+          <a:off x="0" y="0"/>
+          <a:ext cx="0" cy="0"/>
+          <a:chOff x="0" y="0"/>
+          <a:chExt cx="0" cy="0"/>
+        </a:xfrm>
+      </p:grpSpPr>
+      <p:sp>
+        <p:nvSpPr>
+          <p:cNvPr id="2" name="Titre 1">
+            <a:extLst>
+              <a:ext uri="{FF2B5EF4-FFF2-40B4-BE49-F238E27FC236}">
                 <a16:creationId xmlns:a16="http://schemas.microsoft.com/office/drawing/2014/main" id="{0C3CF6A7-E17D-4316-8AD8-CAC6DB3A712D}"/>
               </a:ext>
             </a:extLst>
@@ -8826,7 +9318,7 @@
 </p:sld>
 </file>
 
-<file path=ppt/slides/slide14.xml><?xml version="1.0" encoding="utf-8"?>
+<file path=ppt/slides/slide19.xml><?xml version="1.0" encoding="utf-8"?>
 <p:sld xmlns:a="http://schemas.openxmlformats.org/drawingml/2006/main" xmlns:r="http://schemas.openxmlformats.org/officeDocument/2006/relationships" xmlns:p="http://schemas.openxmlformats.org/presentationml/2006/main">
   <p:cSld>
     <p:spTree>
@@ -8918,476 +9410,6 @@
   <p:clrMapOvr>
     <a:masterClrMapping/>
   </p:clrMapOvr>
-</p:sld>
-</file>
-
-<file path=ppt/slides/slide15.xml><?xml version="1.0" encoding="utf-8"?>
-<p:sld xmlns:a="http://schemas.openxmlformats.org/drawingml/2006/main" xmlns:r="http://schemas.openxmlformats.org/officeDocument/2006/relationships" xmlns:p="http://schemas.openxmlformats.org/presentationml/2006/main">
-  <p:cSld>
-    <p:spTree>
-      <p:nvGrpSpPr>
-        <p:cNvPr id="1" name=""/>
-        <p:cNvGrpSpPr/>
-        <p:nvPr/>
-      </p:nvGrpSpPr>
-      <p:grpSpPr>
-        <a:xfrm>
-          <a:off x="0" y="0"/>
-          <a:ext cx="0" cy="0"/>
-          <a:chOff x="0" y="0"/>
-          <a:chExt cx="0" cy="0"/>
-        </a:xfrm>
-      </p:grpSpPr>
-      <p:sp>
-        <p:nvSpPr>
-          <p:cNvPr id="4" name="Titre 3"/>
-          <p:cNvSpPr>
-            <a:spLocks noGrp="1"/>
-          </p:cNvSpPr>
-          <p:nvPr>
-            <p:ph type="title"/>
-          </p:nvPr>
-        </p:nvSpPr>
-        <p:spPr>
-          <a:xfrm>
-            <a:off x="521207" y="448056"/>
-            <a:ext cx="7783344" cy="640080"/>
-          </a:xfrm>
-        </p:spPr>
-        <p:txBody>
-          <a:bodyPr rtlCol="0">
-            <a:normAutofit/>
-          </a:bodyPr>
-          <a:lstStyle/>
-          <a:p>
-            <a:pPr rtl="0"/>
-            <a:r>
-              <a:rPr lang="fr-FR" noProof="1">
-                <a:latin typeface="Segoe UI Light" panose="020B0502040204020203" pitchFamily="34" charset="0"/>
-                <a:cs typeface="Segoe UI Light" panose="020B0502040204020203" pitchFamily="34" charset="0"/>
-              </a:rPr>
-              <a:t>Vue en couche</a:t>
-            </a:r>
-          </a:p>
-        </p:txBody>
-      </p:sp>
-    </p:spTree>
-    <p:extLst>
-      <p:ext uri="{BB962C8B-B14F-4D97-AF65-F5344CB8AC3E}">
-        <p14:creationId xmlns:p14="http://schemas.microsoft.com/office/powerpoint/2010/main" val="3827382832"/>
-      </p:ext>
-    </p:extLst>
-  </p:cSld>
-  <p:clrMapOvr>
-    <a:masterClrMapping/>
-  </p:clrMapOvr>
-  <mc:AlternateContent xmlns:mc="http://schemas.openxmlformats.org/markup-compatibility/2006" xmlns:p14="http://schemas.microsoft.com/office/powerpoint/2010/main">
-    <mc:Choice Requires="p14">
-      <p:transition p14:dur="10"/>
-    </mc:Choice>
-    <mc:Fallback xmlns="">
-      <p:transition/>
-    </mc:Fallback>
-  </mc:AlternateContent>
-</p:sld>
-</file>
-
-<file path=ppt/slides/slide16.xml><?xml version="1.0" encoding="utf-8"?>
-<p:sld xmlns:a="http://schemas.openxmlformats.org/drawingml/2006/main" xmlns:r="http://schemas.openxmlformats.org/officeDocument/2006/relationships" xmlns:p="http://schemas.openxmlformats.org/presentationml/2006/main">
-  <p:cSld>
-    <p:spTree>
-      <p:nvGrpSpPr>
-        <p:cNvPr id="1" name=""/>
-        <p:cNvGrpSpPr/>
-        <p:nvPr/>
-      </p:nvGrpSpPr>
-      <p:grpSpPr>
-        <a:xfrm>
-          <a:off x="0" y="0"/>
-          <a:ext cx="0" cy="0"/>
-          <a:chOff x="0" y="0"/>
-          <a:chExt cx="0" cy="0"/>
-        </a:xfrm>
-      </p:grpSpPr>
-      <p:sp>
-        <p:nvSpPr>
-          <p:cNvPr id="2" name="Titre 1">
-            <a:extLst>
-              <a:ext uri="{FF2B5EF4-FFF2-40B4-BE49-F238E27FC236}">
-                <a16:creationId xmlns:a16="http://schemas.microsoft.com/office/drawing/2014/main" id="{0C3CF6A7-E17D-4316-8AD8-CAC6DB3A712D}"/>
-              </a:ext>
-            </a:extLst>
-          </p:cNvPr>
-          <p:cNvSpPr>
-            <a:spLocks noGrp="1"/>
-          </p:cNvSpPr>
-          <p:nvPr>
-            <p:ph type="title"/>
-          </p:nvPr>
-        </p:nvSpPr>
-        <p:spPr>
-          <a:xfrm>
-            <a:off x="521207" y="1536192"/>
-            <a:ext cx="10290227" cy="640080"/>
-          </a:xfrm>
-        </p:spPr>
-        <p:txBody>
-          <a:bodyPr>
-            <a:normAutofit/>
-          </a:bodyPr>
-          <a:lstStyle/>
-          <a:p>
-            <a:r>
-              <a:rPr lang="fr-FR" dirty="0"/>
-              <a:t>Accès « non bloquant » (réactif)</a:t>
-            </a:r>
-          </a:p>
-        </p:txBody>
-      </p:sp>
-      <p:pic>
-        <p:nvPicPr>
-          <p:cNvPr id="4" name="Image 3" descr="Une image contenant transport, missile, espace, Espace lointain&#10;&#10;Description générée automatiquement">
-            <a:extLst>
-              <a:ext uri="{FF2B5EF4-FFF2-40B4-BE49-F238E27FC236}">
-                <a16:creationId xmlns:a16="http://schemas.microsoft.com/office/drawing/2014/main" id="{050D4CBF-D9AF-7A6B-4D86-4C1B1CD4F51E}"/>
-              </a:ext>
-            </a:extLst>
-          </p:cNvPr>
-          <p:cNvPicPr>
-            <a:picLocks noChangeAspect="1"/>
-          </p:cNvPicPr>
-          <p:nvPr/>
-        </p:nvPicPr>
-        <p:blipFill>
-          <a:blip r:embed="rId2"/>
-          <a:stretch>
-            <a:fillRect/>
-          </a:stretch>
-        </p:blipFill>
-        <p:spPr>
-          <a:xfrm>
-            <a:off x="3831076" y="2474818"/>
-            <a:ext cx="3957357" cy="3957357"/>
-          </a:xfrm>
-          <a:prstGeom prst="rect">
-            <a:avLst/>
-          </a:prstGeom>
-        </p:spPr>
-      </p:pic>
-    </p:spTree>
-    <p:extLst>
-      <p:ext uri="{BB962C8B-B14F-4D97-AF65-F5344CB8AC3E}">
-        <p14:creationId xmlns:p14="http://schemas.microsoft.com/office/powerpoint/2010/main" val="2470160587"/>
-      </p:ext>
-    </p:extLst>
-  </p:cSld>
-  <p:clrMapOvr>
-    <a:masterClrMapping/>
-  </p:clrMapOvr>
-</p:sld>
-</file>
-
-<file path=ppt/slides/slide17.xml><?xml version="1.0" encoding="utf-8"?>
-<p:sld xmlns:a="http://schemas.openxmlformats.org/drawingml/2006/main" xmlns:r="http://schemas.openxmlformats.org/officeDocument/2006/relationships" xmlns:p="http://schemas.openxmlformats.org/presentationml/2006/main">
-  <p:cSld>
-    <p:spTree>
-      <p:nvGrpSpPr>
-        <p:cNvPr id="1" name=""/>
-        <p:cNvGrpSpPr/>
-        <p:nvPr/>
-      </p:nvGrpSpPr>
-      <p:grpSpPr>
-        <a:xfrm>
-          <a:off x="0" y="0"/>
-          <a:ext cx="0" cy="0"/>
-          <a:chOff x="0" y="0"/>
-          <a:chExt cx="0" cy="0"/>
-        </a:xfrm>
-      </p:grpSpPr>
-      <p:sp>
-        <p:nvSpPr>
-          <p:cNvPr id="4" name="Titre 3"/>
-          <p:cNvSpPr>
-            <a:spLocks noGrp="1"/>
-          </p:cNvSpPr>
-          <p:nvPr>
-            <p:ph type="title"/>
-          </p:nvPr>
-        </p:nvSpPr>
-        <p:spPr>
-          <a:xfrm>
-            <a:off x="521207" y="448056"/>
-            <a:ext cx="7783344" cy="640080"/>
-          </a:xfrm>
-        </p:spPr>
-        <p:txBody>
-          <a:bodyPr rtlCol="0">
-            <a:normAutofit/>
-          </a:bodyPr>
-          <a:lstStyle/>
-          <a:p>
-            <a:pPr rtl="0"/>
-            <a:r>
-              <a:rPr lang="fr-FR" noProof="1">
-                <a:latin typeface="Segoe UI Light" panose="020B0502040204020203" pitchFamily="34" charset="0"/>
-                <a:cs typeface="Segoe UI Light" panose="020B0502040204020203" pitchFamily="34" charset="0"/>
-              </a:rPr>
-              <a:t>Log</a:t>
-            </a:r>
-          </a:p>
-        </p:txBody>
-      </p:sp>
-      <p:sp>
-        <p:nvSpPr>
-          <p:cNvPr id="7" name="ZoneTexte 6">
-            <a:extLst>
-              <a:ext uri="{FF2B5EF4-FFF2-40B4-BE49-F238E27FC236}">
-                <a16:creationId xmlns:a16="http://schemas.microsoft.com/office/drawing/2014/main" id="{1351B732-5CDD-4F7E-9691-AF0E2CE8CDA3}"/>
-              </a:ext>
-            </a:extLst>
-          </p:cNvPr>
-          <p:cNvSpPr txBox="1"/>
-          <p:nvPr/>
-        </p:nvSpPr>
-        <p:spPr>
-          <a:xfrm>
-            <a:off x="521206" y="1708681"/>
-            <a:ext cx="10338081" cy="369332"/>
-          </a:xfrm>
-          <a:prstGeom prst="rect">
-            <a:avLst/>
-          </a:prstGeom>
-          <a:noFill/>
-        </p:spPr>
-        <p:txBody>
-          <a:bodyPr wrap="square">
-            <a:spAutoFit/>
-          </a:bodyPr>
-          <a:lstStyle/>
-          <a:p>
-            <a:r>
-              <a:rPr lang="fr-FR" dirty="0">
-                <a:sym typeface="Wingdings" panose="05000000000000000000" pitchFamily="2" charset="2"/>
-              </a:rPr>
-              <a:t>f</a:t>
-            </a:r>
-          </a:p>
-        </p:txBody>
-      </p:sp>
-    </p:spTree>
-    <p:extLst>
-      <p:ext uri="{BB962C8B-B14F-4D97-AF65-F5344CB8AC3E}">
-        <p14:creationId xmlns:p14="http://schemas.microsoft.com/office/powerpoint/2010/main" val="3037234062"/>
-      </p:ext>
-    </p:extLst>
-  </p:cSld>
-  <p:clrMapOvr>
-    <a:masterClrMapping/>
-  </p:clrMapOvr>
-  <mc:AlternateContent xmlns:mc="http://schemas.openxmlformats.org/markup-compatibility/2006" xmlns:p14="http://schemas.microsoft.com/office/powerpoint/2010/main">
-    <mc:Choice Requires="p14">
-      <p:transition p14:dur="10"/>
-    </mc:Choice>
-    <mc:Fallback xmlns="">
-      <p:transition/>
-    </mc:Fallback>
-  </mc:AlternateContent>
-</p:sld>
-</file>
-
-<file path=ppt/slides/slide18.xml><?xml version="1.0" encoding="utf-8"?>
-<p:sld xmlns:a="http://schemas.openxmlformats.org/drawingml/2006/main" xmlns:r="http://schemas.openxmlformats.org/officeDocument/2006/relationships" xmlns:p="http://schemas.openxmlformats.org/presentationml/2006/main">
-  <p:cSld>
-    <p:spTree>
-      <p:nvGrpSpPr>
-        <p:cNvPr id="1" name=""/>
-        <p:cNvGrpSpPr/>
-        <p:nvPr/>
-      </p:nvGrpSpPr>
-      <p:grpSpPr>
-        <a:xfrm>
-          <a:off x="0" y="0"/>
-          <a:ext cx="0" cy="0"/>
-          <a:chOff x="0" y="0"/>
-          <a:chExt cx="0" cy="0"/>
-        </a:xfrm>
-      </p:grpSpPr>
-      <p:sp>
-        <p:nvSpPr>
-          <p:cNvPr id="2" name="Titre 1">
-            <a:extLst>
-              <a:ext uri="{FF2B5EF4-FFF2-40B4-BE49-F238E27FC236}">
-                <a16:creationId xmlns:a16="http://schemas.microsoft.com/office/drawing/2014/main" id="{0C3CF6A7-E17D-4316-8AD8-CAC6DB3A712D}"/>
-              </a:ext>
-            </a:extLst>
-          </p:cNvPr>
-          <p:cNvSpPr>
-            <a:spLocks noGrp="1"/>
-          </p:cNvSpPr>
-          <p:nvPr>
-            <p:ph type="title"/>
-          </p:nvPr>
-        </p:nvSpPr>
-        <p:spPr/>
-        <p:txBody>
-          <a:bodyPr/>
-          <a:lstStyle/>
-          <a:p>
-            <a:r>
-              <a:rPr lang="fr-FR" dirty="0"/>
-              <a:t>Les différentes « stack » logicielles</a:t>
-            </a:r>
-          </a:p>
-        </p:txBody>
-      </p:sp>
-      <p:pic>
-        <p:nvPicPr>
-          <p:cNvPr id="4" name="Image 3" descr="Une image contenant livre, pile&#10;&#10;Description générée automatiquement">
-            <a:extLst>
-              <a:ext uri="{FF2B5EF4-FFF2-40B4-BE49-F238E27FC236}">
-                <a16:creationId xmlns:a16="http://schemas.microsoft.com/office/drawing/2014/main" id="{393D76C5-8733-F62C-2406-378FF6679C57}"/>
-              </a:ext>
-            </a:extLst>
-          </p:cNvPr>
-          <p:cNvPicPr>
-            <a:picLocks noChangeAspect="1"/>
-          </p:cNvPicPr>
-          <p:nvPr/>
-        </p:nvPicPr>
-        <p:blipFill>
-          <a:blip r:embed="rId2"/>
-          <a:stretch>
-            <a:fillRect/>
-          </a:stretch>
-        </p:blipFill>
-        <p:spPr>
-          <a:xfrm>
-            <a:off x="4290172" y="3093384"/>
-            <a:ext cx="2571750" cy="2571750"/>
-          </a:xfrm>
-          <a:prstGeom prst="rect">
-            <a:avLst/>
-          </a:prstGeom>
-        </p:spPr>
-      </p:pic>
-    </p:spTree>
-    <p:extLst>
-      <p:ext uri="{BB962C8B-B14F-4D97-AF65-F5344CB8AC3E}">
-        <p14:creationId xmlns:p14="http://schemas.microsoft.com/office/powerpoint/2010/main" val="1983228113"/>
-      </p:ext>
-    </p:extLst>
-  </p:cSld>
-  <p:clrMapOvr>
-    <a:masterClrMapping/>
-  </p:clrMapOvr>
-</p:sld>
-</file>
-
-<file path=ppt/slides/slide19.xml><?xml version="1.0" encoding="utf-8"?>
-<p:sld xmlns:a="http://schemas.openxmlformats.org/drawingml/2006/main" xmlns:r="http://schemas.openxmlformats.org/officeDocument/2006/relationships" xmlns:p="http://schemas.openxmlformats.org/presentationml/2006/main">
-  <p:cSld>
-    <p:spTree>
-      <p:nvGrpSpPr>
-        <p:cNvPr id="1" name=""/>
-        <p:cNvGrpSpPr/>
-        <p:nvPr/>
-      </p:nvGrpSpPr>
-      <p:grpSpPr>
-        <a:xfrm>
-          <a:off x="0" y="0"/>
-          <a:ext cx="0" cy="0"/>
-          <a:chOff x="0" y="0"/>
-          <a:chExt cx="0" cy="0"/>
-        </a:xfrm>
-      </p:grpSpPr>
-      <p:sp>
-        <p:nvSpPr>
-          <p:cNvPr id="4" name="Titre 3"/>
-          <p:cNvSpPr>
-            <a:spLocks noGrp="1"/>
-          </p:cNvSpPr>
-          <p:nvPr>
-            <p:ph type="title"/>
-          </p:nvPr>
-        </p:nvSpPr>
-        <p:spPr>
-          <a:xfrm>
-            <a:off x="521207" y="448056"/>
-            <a:ext cx="7783344" cy="640080"/>
-          </a:xfrm>
-        </p:spPr>
-        <p:txBody>
-          <a:bodyPr rtlCol="0">
-            <a:normAutofit/>
-          </a:bodyPr>
-          <a:lstStyle/>
-          <a:p>
-            <a:pPr rtl="0"/>
-            <a:r>
-              <a:rPr lang="fr-FR" noProof="1">
-                <a:latin typeface="Segoe UI Light" panose="020B0502040204020203" pitchFamily="34" charset="0"/>
-                <a:cs typeface="Segoe UI Light" panose="020B0502040204020203" pitchFamily="34" charset="0"/>
-              </a:rPr>
-              <a:t>Log</a:t>
-            </a:r>
-          </a:p>
-        </p:txBody>
-      </p:sp>
-      <p:sp>
-        <p:nvSpPr>
-          <p:cNvPr id="7" name="ZoneTexte 6">
-            <a:extLst>
-              <a:ext uri="{FF2B5EF4-FFF2-40B4-BE49-F238E27FC236}">
-                <a16:creationId xmlns:a16="http://schemas.microsoft.com/office/drawing/2014/main" id="{1351B732-5CDD-4F7E-9691-AF0E2CE8CDA3}"/>
-              </a:ext>
-            </a:extLst>
-          </p:cNvPr>
-          <p:cNvSpPr txBox="1"/>
-          <p:nvPr/>
-        </p:nvSpPr>
-        <p:spPr>
-          <a:xfrm>
-            <a:off x="521206" y="1708681"/>
-            <a:ext cx="10338081" cy="369332"/>
-          </a:xfrm>
-          <a:prstGeom prst="rect">
-            <a:avLst/>
-          </a:prstGeom>
-          <a:noFill/>
-        </p:spPr>
-        <p:txBody>
-          <a:bodyPr wrap="square">
-            <a:spAutoFit/>
-          </a:bodyPr>
-          <a:lstStyle/>
-          <a:p>
-            <a:r>
-              <a:rPr lang="fr-FR" dirty="0">
-                <a:sym typeface="Wingdings" panose="05000000000000000000" pitchFamily="2" charset="2"/>
-              </a:rPr>
-              <a:t>f</a:t>
-            </a:r>
-          </a:p>
-        </p:txBody>
-      </p:sp>
-    </p:spTree>
-    <p:extLst>
-      <p:ext uri="{BB962C8B-B14F-4D97-AF65-F5344CB8AC3E}">
-        <p14:creationId xmlns:p14="http://schemas.microsoft.com/office/powerpoint/2010/main" val="2391648638"/>
-      </p:ext>
-    </p:extLst>
-  </p:cSld>
-  <p:clrMapOvr>
-    <a:masterClrMapping/>
-  </p:clrMapOvr>
-  <mc:AlternateContent xmlns:mc="http://schemas.openxmlformats.org/markup-compatibility/2006" xmlns:p14="http://schemas.microsoft.com/office/powerpoint/2010/main">
-    <mc:Choice Requires="p14">
-      <p:transition p14:dur="10"/>
-    </mc:Choice>
-    <mc:Fallback xmlns="">
-      <p:transition/>
-    </mc:Fallback>
-  </mc:AlternateContent>
 </p:sld>
 </file>
 
@@ -9627,6 +9649,476 @@
       </p:grpSpPr>
       <p:sp>
         <p:nvSpPr>
+          <p:cNvPr id="4" name="Titre 3"/>
+          <p:cNvSpPr>
+            <a:spLocks noGrp="1"/>
+          </p:cNvSpPr>
+          <p:nvPr>
+            <p:ph type="title"/>
+          </p:nvPr>
+        </p:nvSpPr>
+        <p:spPr>
+          <a:xfrm>
+            <a:off x="521207" y="448056"/>
+            <a:ext cx="7783344" cy="640080"/>
+          </a:xfrm>
+        </p:spPr>
+        <p:txBody>
+          <a:bodyPr rtlCol="0">
+            <a:normAutofit/>
+          </a:bodyPr>
+          <a:lstStyle/>
+          <a:p>
+            <a:pPr rtl="0"/>
+            <a:r>
+              <a:rPr lang="fr-FR" noProof="1">
+                <a:latin typeface="Segoe UI Light" panose="020B0502040204020203" pitchFamily="34" charset="0"/>
+                <a:cs typeface="Segoe UI Light" panose="020B0502040204020203" pitchFamily="34" charset="0"/>
+              </a:rPr>
+              <a:t>Vue en couche</a:t>
+            </a:r>
+          </a:p>
+        </p:txBody>
+      </p:sp>
+    </p:spTree>
+    <p:extLst>
+      <p:ext uri="{BB962C8B-B14F-4D97-AF65-F5344CB8AC3E}">
+        <p14:creationId xmlns:p14="http://schemas.microsoft.com/office/powerpoint/2010/main" val="3827382832"/>
+      </p:ext>
+    </p:extLst>
+  </p:cSld>
+  <p:clrMapOvr>
+    <a:masterClrMapping/>
+  </p:clrMapOvr>
+  <mc:AlternateContent xmlns:mc="http://schemas.openxmlformats.org/markup-compatibility/2006" xmlns:p14="http://schemas.microsoft.com/office/powerpoint/2010/main">
+    <mc:Choice Requires="p14">
+      <p:transition p14:dur="10"/>
+    </mc:Choice>
+    <mc:Fallback xmlns="">
+      <p:transition/>
+    </mc:Fallback>
+  </mc:AlternateContent>
+</p:sld>
+</file>
+
+<file path=ppt/slides/slide21.xml><?xml version="1.0" encoding="utf-8"?>
+<p:sld xmlns:a="http://schemas.openxmlformats.org/drawingml/2006/main" xmlns:r="http://schemas.openxmlformats.org/officeDocument/2006/relationships" xmlns:p="http://schemas.openxmlformats.org/presentationml/2006/main">
+  <p:cSld>
+    <p:spTree>
+      <p:nvGrpSpPr>
+        <p:cNvPr id="1" name=""/>
+        <p:cNvGrpSpPr/>
+        <p:nvPr/>
+      </p:nvGrpSpPr>
+      <p:grpSpPr>
+        <a:xfrm>
+          <a:off x="0" y="0"/>
+          <a:ext cx="0" cy="0"/>
+          <a:chOff x="0" y="0"/>
+          <a:chExt cx="0" cy="0"/>
+        </a:xfrm>
+      </p:grpSpPr>
+      <p:sp>
+        <p:nvSpPr>
+          <p:cNvPr id="2" name="Titre 1">
+            <a:extLst>
+              <a:ext uri="{FF2B5EF4-FFF2-40B4-BE49-F238E27FC236}">
+                <a16:creationId xmlns:a16="http://schemas.microsoft.com/office/drawing/2014/main" id="{0C3CF6A7-E17D-4316-8AD8-CAC6DB3A712D}"/>
+              </a:ext>
+            </a:extLst>
+          </p:cNvPr>
+          <p:cNvSpPr>
+            <a:spLocks noGrp="1"/>
+          </p:cNvSpPr>
+          <p:nvPr>
+            <p:ph type="title"/>
+          </p:nvPr>
+        </p:nvSpPr>
+        <p:spPr>
+          <a:xfrm>
+            <a:off x="521207" y="1536192"/>
+            <a:ext cx="10290227" cy="640080"/>
+          </a:xfrm>
+        </p:spPr>
+        <p:txBody>
+          <a:bodyPr>
+            <a:normAutofit/>
+          </a:bodyPr>
+          <a:lstStyle/>
+          <a:p>
+            <a:r>
+              <a:rPr lang="fr-FR" dirty="0"/>
+              <a:t>Accès « non bloquant » (réactif)</a:t>
+            </a:r>
+          </a:p>
+        </p:txBody>
+      </p:sp>
+      <p:pic>
+        <p:nvPicPr>
+          <p:cNvPr id="4" name="Image 3" descr="Une image contenant transport, missile, espace, Espace lointain&#10;&#10;Description générée automatiquement">
+            <a:extLst>
+              <a:ext uri="{FF2B5EF4-FFF2-40B4-BE49-F238E27FC236}">
+                <a16:creationId xmlns:a16="http://schemas.microsoft.com/office/drawing/2014/main" id="{050D4CBF-D9AF-7A6B-4D86-4C1B1CD4F51E}"/>
+              </a:ext>
+            </a:extLst>
+          </p:cNvPr>
+          <p:cNvPicPr>
+            <a:picLocks noChangeAspect="1"/>
+          </p:cNvPicPr>
+          <p:nvPr/>
+        </p:nvPicPr>
+        <p:blipFill>
+          <a:blip r:embed="rId2"/>
+          <a:stretch>
+            <a:fillRect/>
+          </a:stretch>
+        </p:blipFill>
+        <p:spPr>
+          <a:xfrm>
+            <a:off x="3831076" y="2474818"/>
+            <a:ext cx="3957357" cy="3957357"/>
+          </a:xfrm>
+          <a:prstGeom prst="rect">
+            <a:avLst/>
+          </a:prstGeom>
+        </p:spPr>
+      </p:pic>
+    </p:spTree>
+    <p:extLst>
+      <p:ext uri="{BB962C8B-B14F-4D97-AF65-F5344CB8AC3E}">
+        <p14:creationId xmlns:p14="http://schemas.microsoft.com/office/powerpoint/2010/main" val="2470160587"/>
+      </p:ext>
+    </p:extLst>
+  </p:cSld>
+  <p:clrMapOvr>
+    <a:masterClrMapping/>
+  </p:clrMapOvr>
+</p:sld>
+</file>
+
+<file path=ppt/slides/slide22.xml><?xml version="1.0" encoding="utf-8"?>
+<p:sld xmlns:a="http://schemas.openxmlformats.org/drawingml/2006/main" xmlns:r="http://schemas.openxmlformats.org/officeDocument/2006/relationships" xmlns:p="http://schemas.openxmlformats.org/presentationml/2006/main">
+  <p:cSld>
+    <p:spTree>
+      <p:nvGrpSpPr>
+        <p:cNvPr id="1" name=""/>
+        <p:cNvGrpSpPr/>
+        <p:nvPr/>
+      </p:nvGrpSpPr>
+      <p:grpSpPr>
+        <a:xfrm>
+          <a:off x="0" y="0"/>
+          <a:ext cx="0" cy="0"/>
+          <a:chOff x="0" y="0"/>
+          <a:chExt cx="0" cy="0"/>
+        </a:xfrm>
+      </p:grpSpPr>
+      <p:sp>
+        <p:nvSpPr>
+          <p:cNvPr id="4" name="Titre 3"/>
+          <p:cNvSpPr>
+            <a:spLocks noGrp="1"/>
+          </p:cNvSpPr>
+          <p:nvPr>
+            <p:ph type="title"/>
+          </p:nvPr>
+        </p:nvSpPr>
+        <p:spPr>
+          <a:xfrm>
+            <a:off x="521207" y="448056"/>
+            <a:ext cx="7783344" cy="640080"/>
+          </a:xfrm>
+        </p:spPr>
+        <p:txBody>
+          <a:bodyPr rtlCol="0">
+            <a:normAutofit/>
+          </a:bodyPr>
+          <a:lstStyle/>
+          <a:p>
+            <a:pPr rtl="0"/>
+            <a:r>
+              <a:rPr lang="fr-FR" noProof="1">
+                <a:latin typeface="Segoe UI Light" panose="020B0502040204020203" pitchFamily="34" charset="0"/>
+                <a:cs typeface="Segoe UI Light" panose="020B0502040204020203" pitchFamily="34" charset="0"/>
+              </a:rPr>
+              <a:t>Log</a:t>
+            </a:r>
+          </a:p>
+        </p:txBody>
+      </p:sp>
+      <p:sp>
+        <p:nvSpPr>
+          <p:cNvPr id="7" name="ZoneTexte 6">
+            <a:extLst>
+              <a:ext uri="{FF2B5EF4-FFF2-40B4-BE49-F238E27FC236}">
+                <a16:creationId xmlns:a16="http://schemas.microsoft.com/office/drawing/2014/main" id="{1351B732-5CDD-4F7E-9691-AF0E2CE8CDA3}"/>
+              </a:ext>
+            </a:extLst>
+          </p:cNvPr>
+          <p:cNvSpPr txBox="1"/>
+          <p:nvPr/>
+        </p:nvSpPr>
+        <p:spPr>
+          <a:xfrm>
+            <a:off x="521206" y="1708681"/>
+            <a:ext cx="10338081" cy="369332"/>
+          </a:xfrm>
+          <a:prstGeom prst="rect">
+            <a:avLst/>
+          </a:prstGeom>
+          <a:noFill/>
+        </p:spPr>
+        <p:txBody>
+          <a:bodyPr wrap="square">
+            <a:spAutoFit/>
+          </a:bodyPr>
+          <a:lstStyle/>
+          <a:p>
+            <a:r>
+              <a:rPr lang="fr-FR" dirty="0">
+                <a:sym typeface="Wingdings" panose="05000000000000000000" pitchFamily="2" charset="2"/>
+              </a:rPr>
+              <a:t>f</a:t>
+            </a:r>
+          </a:p>
+        </p:txBody>
+      </p:sp>
+    </p:spTree>
+    <p:extLst>
+      <p:ext uri="{BB962C8B-B14F-4D97-AF65-F5344CB8AC3E}">
+        <p14:creationId xmlns:p14="http://schemas.microsoft.com/office/powerpoint/2010/main" val="3037234062"/>
+      </p:ext>
+    </p:extLst>
+  </p:cSld>
+  <p:clrMapOvr>
+    <a:masterClrMapping/>
+  </p:clrMapOvr>
+  <mc:AlternateContent xmlns:mc="http://schemas.openxmlformats.org/markup-compatibility/2006" xmlns:p14="http://schemas.microsoft.com/office/powerpoint/2010/main">
+    <mc:Choice Requires="p14">
+      <p:transition p14:dur="10"/>
+    </mc:Choice>
+    <mc:Fallback xmlns="">
+      <p:transition/>
+    </mc:Fallback>
+  </mc:AlternateContent>
+</p:sld>
+</file>
+
+<file path=ppt/slides/slide23.xml><?xml version="1.0" encoding="utf-8"?>
+<p:sld xmlns:a="http://schemas.openxmlformats.org/drawingml/2006/main" xmlns:r="http://schemas.openxmlformats.org/officeDocument/2006/relationships" xmlns:p="http://schemas.openxmlformats.org/presentationml/2006/main">
+  <p:cSld>
+    <p:spTree>
+      <p:nvGrpSpPr>
+        <p:cNvPr id="1" name=""/>
+        <p:cNvGrpSpPr/>
+        <p:nvPr/>
+      </p:nvGrpSpPr>
+      <p:grpSpPr>
+        <a:xfrm>
+          <a:off x="0" y="0"/>
+          <a:ext cx="0" cy="0"/>
+          <a:chOff x="0" y="0"/>
+          <a:chExt cx="0" cy="0"/>
+        </a:xfrm>
+      </p:grpSpPr>
+      <p:sp>
+        <p:nvSpPr>
+          <p:cNvPr id="2" name="Titre 1">
+            <a:extLst>
+              <a:ext uri="{FF2B5EF4-FFF2-40B4-BE49-F238E27FC236}">
+                <a16:creationId xmlns:a16="http://schemas.microsoft.com/office/drawing/2014/main" id="{0C3CF6A7-E17D-4316-8AD8-CAC6DB3A712D}"/>
+              </a:ext>
+            </a:extLst>
+          </p:cNvPr>
+          <p:cNvSpPr>
+            <a:spLocks noGrp="1"/>
+          </p:cNvSpPr>
+          <p:nvPr>
+            <p:ph type="title"/>
+          </p:nvPr>
+        </p:nvSpPr>
+        <p:spPr/>
+        <p:txBody>
+          <a:bodyPr/>
+          <a:lstStyle/>
+          <a:p>
+            <a:r>
+              <a:rPr lang="fr-FR" dirty="0"/>
+              <a:t>Les différentes « stack » logicielles</a:t>
+            </a:r>
+          </a:p>
+        </p:txBody>
+      </p:sp>
+      <p:pic>
+        <p:nvPicPr>
+          <p:cNvPr id="4" name="Image 3" descr="Une image contenant livre, pile&#10;&#10;Description générée automatiquement">
+            <a:extLst>
+              <a:ext uri="{FF2B5EF4-FFF2-40B4-BE49-F238E27FC236}">
+                <a16:creationId xmlns:a16="http://schemas.microsoft.com/office/drawing/2014/main" id="{393D76C5-8733-F62C-2406-378FF6679C57}"/>
+              </a:ext>
+            </a:extLst>
+          </p:cNvPr>
+          <p:cNvPicPr>
+            <a:picLocks noChangeAspect="1"/>
+          </p:cNvPicPr>
+          <p:nvPr/>
+        </p:nvPicPr>
+        <p:blipFill>
+          <a:blip r:embed="rId2"/>
+          <a:stretch>
+            <a:fillRect/>
+          </a:stretch>
+        </p:blipFill>
+        <p:spPr>
+          <a:xfrm>
+            <a:off x="4290172" y="3093384"/>
+            <a:ext cx="2571750" cy="2571750"/>
+          </a:xfrm>
+          <a:prstGeom prst="rect">
+            <a:avLst/>
+          </a:prstGeom>
+        </p:spPr>
+      </p:pic>
+    </p:spTree>
+    <p:extLst>
+      <p:ext uri="{BB962C8B-B14F-4D97-AF65-F5344CB8AC3E}">
+        <p14:creationId xmlns:p14="http://schemas.microsoft.com/office/powerpoint/2010/main" val="1983228113"/>
+      </p:ext>
+    </p:extLst>
+  </p:cSld>
+  <p:clrMapOvr>
+    <a:masterClrMapping/>
+  </p:clrMapOvr>
+</p:sld>
+</file>
+
+<file path=ppt/slides/slide24.xml><?xml version="1.0" encoding="utf-8"?>
+<p:sld xmlns:a="http://schemas.openxmlformats.org/drawingml/2006/main" xmlns:r="http://schemas.openxmlformats.org/officeDocument/2006/relationships" xmlns:p="http://schemas.openxmlformats.org/presentationml/2006/main">
+  <p:cSld>
+    <p:spTree>
+      <p:nvGrpSpPr>
+        <p:cNvPr id="1" name=""/>
+        <p:cNvGrpSpPr/>
+        <p:nvPr/>
+      </p:nvGrpSpPr>
+      <p:grpSpPr>
+        <a:xfrm>
+          <a:off x="0" y="0"/>
+          <a:ext cx="0" cy="0"/>
+          <a:chOff x="0" y="0"/>
+          <a:chExt cx="0" cy="0"/>
+        </a:xfrm>
+      </p:grpSpPr>
+      <p:sp>
+        <p:nvSpPr>
+          <p:cNvPr id="4" name="Titre 3"/>
+          <p:cNvSpPr>
+            <a:spLocks noGrp="1"/>
+          </p:cNvSpPr>
+          <p:nvPr>
+            <p:ph type="title"/>
+          </p:nvPr>
+        </p:nvSpPr>
+        <p:spPr>
+          <a:xfrm>
+            <a:off x="521207" y="448056"/>
+            <a:ext cx="7783344" cy="640080"/>
+          </a:xfrm>
+        </p:spPr>
+        <p:txBody>
+          <a:bodyPr rtlCol="0">
+            <a:normAutofit/>
+          </a:bodyPr>
+          <a:lstStyle/>
+          <a:p>
+            <a:pPr rtl="0"/>
+            <a:r>
+              <a:rPr lang="fr-FR" noProof="1">
+                <a:latin typeface="Segoe UI Light" panose="020B0502040204020203" pitchFamily="34" charset="0"/>
+                <a:cs typeface="Segoe UI Light" panose="020B0502040204020203" pitchFamily="34" charset="0"/>
+              </a:rPr>
+              <a:t>Log</a:t>
+            </a:r>
+          </a:p>
+        </p:txBody>
+      </p:sp>
+      <p:sp>
+        <p:nvSpPr>
+          <p:cNvPr id="7" name="ZoneTexte 6">
+            <a:extLst>
+              <a:ext uri="{FF2B5EF4-FFF2-40B4-BE49-F238E27FC236}">
+                <a16:creationId xmlns:a16="http://schemas.microsoft.com/office/drawing/2014/main" id="{1351B732-5CDD-4F7E-9691-AF0E2CE8CDA3}"/>
+              </a:ext>
+            </a:extLst>
+          </p:cNvPr>
+          <p:cNvSpPr txBox="1"/>
+          <p:nvPr/>
+        </p:nvSpPr>
+        <p:spPr>
+          <a:xfrm>
+            <a:off x="521206" y="1708681"/>
+            <a:ext cx="10338081" cy="369332"/>
+          </a:xfrm>
+          <a:prstGeom prst="rect">
+            <a:avLst/>
+          </a:prstGeom>
+          <a:noFill/>
+        </p:spPr>
+        <p:txBody>
+          <a:bodyPr wrap="square">
+            <a:spAutoFit/>
+          </a:bodyPr>
+          <a:lstStyle/>
+          <a:p>
+            <a:r>
+              <a:rPr lang="fr-FR" dirty="0">
+                <a:sym typeface="Wingdings" panose="05000000000000000000" pitchFamily="2" charset="2"/>
+              </a:rPr>
+              <a:t>f</a:t>
+            </a:r>
+          </a:p>
+        </p:txBody>
+      </p:sp>
+    </p:spTree>
+    <p:extLst>
+      <p:ext uri="{BB962C8B-B14F-4D97-AF65-F5344CB8AC3E}">
+        <p14:creationId xmlns:p14="http://schemas.microsoft.com/office/powerpoint/2010/main" val="2391648638"/>
+      </p:ext>
+    </p:extLst>
+  </p:cSld>
+  <p:clrMapOvr>
+    <a:masterClrMapping/>
+  </p:clrMapOvr>
+  <mc:AlternateContent xmlns:mc="http://schemas.openxmlformats.org/markup-compatibility/2006" xmlns:p14="http://schemas.microsoft.com/office/powerpoint/2010/main">
+    <mc:Choice Requires="p14">
+      <p:transition p14:dur="10"/>
+    </mc:Choice>
+    <mc:Fallback xmlns="">
+      <p:transition/>
+    </mc:Fallback>
+  </mc:AlternateContent>
+</p:sld>
+</file>
+
+<file path=ppt/slides/slide25.xml><?xml version="1.0" encoding="utf-8"?>
+<p:sld xmlns:a="http://schemas.openxmlformats.org/drawingml/2006/main" xmlns:r="http://schemas.openxmlformats.org/officeDocument/2006/relationships" xmlns:p="http://schemas.openxmlformats.org/presentationml/2006/main">
+  <p:cSld>
+    <p:spTree>
+      <p:nvGrpSpPr>
+        <p:cNvPr id="1" name=""/>
+        <p:cNvGrpSpPr/>
+        <p:nvPr/>
+      </p:nvGrpSpPr>
+      <p:grpSpPr>
+        <a:xfrm>
+          <a:off x="0" y="0"/>
+          <a:ext cx="0" cy="0"/>
+          <a:chOff x="0" y="0"/>
+          <a:chExt cx="0" cy="0"/>
+        </a:xfrm>
+      </p:grpSpPr>
+      <p:sp>
+        <p:nvSpPr>
           <p:cNvPr id="2" name="Titre 1">
             <a:extLst>
               <a:ext uri="{FF2B5EF4-FFF2-40B4-BE49-F238E27FC236}">
@@ -9696,7 +10188,7 @@
 </p:sld>
 </file>
 
-<file path=ppt/slides/slide21.xml><?xml version="1.0" encoding="utf-8"?>
+<file path=ppt/slides/slide26.xml><?xml version="1.0" encoding="utf-8"?>
 <p:sld xmlns:a="http://schemas.openxmlformats.org/drawingml/2006/main" xmlns:r="http://schemas.openxmlformats.org/officeDocument/2006/relationships" xmlns:p="http://schemas.openxmlformats.org/presentationml/2006/main">
   <p:cSld>
     <p:spTree>
@@ -9761,7 +10253,7 @@
         <p:spPr>
           <a:xfrm>
             <a:off x="521206" y="1708681"/>
-            <a:ext cx="10338081" cy="2862322"/>
+            <a:ext cx="10338081" cy="3693319"/>
           </a:xfrm>
           <a:prstGeom prst="rect">
             <a:avLst/>
@@ -9779,6 +10271,21 @@
                 <a:sym typeface="Wingdings" panose="05000000000000000000" pitchFamily="2" charset="2"/>
                 <a:hlinkClick r:id="rId3"/>
               </a:rPr>
+              <a:t>https://docs.oracle.com/en/java/javase/21/core/virtual-threads.html#GUID-6444CF1A-FCAD-4F8A-877F-4A72AA0143B7</a:t>
+            </a:r>
+          </a:p>
+          <a:p>
+            <a:endParaRPr lang="fr-FR" dirty="0">
+              <a:sym typeface="Wingdings" panose="05000000000000000000" pitchFamily="2" charset="2"/>
+              <a:hlinkClick r:id="rId3"/>
+            </a:endParaRPr>
+          </a:p>
+          <a:p>
+            <a:r>
+              <a:rPr lang="fr-FR" dirty="0">
+                <a:sym typeface="Wingdings" panose="05000000000000000000" pitchFamily="2" charset="2"/>
+                <a:hlinkClick r:id="rId3"/>
+              </a:rPr>
               <a:t>https://spring.io/blog/2023/09/19/this-week-in-spring-september-19th-2023-java-21-edition</a:t>
             </a:r>
             <a:endParaRPr lang="fr-FR" dirty="0">
@@ -9826,14 +10333,14 @@
           </a:p>
           <a:p>
             <a:r>
-              <a:rPr lang="fr-FR">
+              <a:rPr lang="fr-FR" dirty="0">
                 <a:sym typeface="Wingdings" panose="05000000000000000000" pitchFamily="2" charset="2"/>
                 <a:hlinkClick r:id="rId5"/>
               </a:rPr>
               <a:t>https://www.postgresql.org/about/news/postgresql-jdbc-4260-released-2613/</a:t>
             </a:r>
             <a:r>
-              <a:rPr lang="fr-FR">
+              <a:rPr lang="fr-FR" dirty="0">
                 <a:sym typeface="Wingdings" panose="05000000000000000000" pitchFamily="2" charset="2"/>
               </a:rPr>
               <a:t> </a:t>
@@ -9877,7 +10384,7 @@
 </p:sld>
 </file>
 
-<file path=ppt/slides/slide22.xml><?xml version="1.0" encoding="utf-8"?>
+<file path=ppt/slides/slide27.xml><?xml version="1.0" encoding="utf-8"?>
 <p:sld xmlns:a="http://schemas.openxmlformats.org/drawingml/2006/main" xmlns:r="http://schemas.openxmlformats.org/officeDocument/2006/relationships" xmlns:p="http://schemas.openxmlformats.org/presentationml/2006/main">
   <p:cSld>
     <p:spTree>
@@ -14906,21 +15413,21 @@
 </file>
 
 <file path=customXml/item1.xml><?xml version="1.0" encoding="utf-8"?>
+<p:properties xmlns:p="http://schemas.microsoft.com/office/2006/metadata/properties" xmlns:xsi="http://www.w3.org/2001/XMLSchema-instance" xmlns:pc="http://schemas.microsoft.com/office/infopath/2007/PartnerControls">
+  <documentManagement>
+    <Status xmlns="71af3243-3dd4-4a8d-8c0d-dd76da1f02a5">Not started</Status>
+    <MediaServiceKeyPoints xmlns="71af3243-3dd4-4a8d-8c0d-dd76da1f02a5" xsi:nil="true"/>
+  </documentManagement>
+</p:properties>
+</file>
+
+<file path=customXml/item2.xml><?xml version="1.0" encoding="utf-8"?>
 <?mso-contentType ?>
 <FormTemplates xmlns="http://schemas.microsoft.com/sharepoint/v3/contenttype/forms">
   <Display>DocumentLibraryForm</Display>
   <Edit>DocumentLibraryForm</Edit>
   <New>DocumentLibraryForm</New>
 </FormTemplates>
-</file>
-
-<file path=customXml/item2.xml><?xml version="1.0" encoding="utf-8"?>
-<p:properties xmlns:p="http://schemas.microsoft.com/office/2006/metadata/properties" xmlns:xsi="http://www.w3.org/2001/XMLSchema-instance" xmlns:pc="http://schemas.microsoft.com/office/infopath/2007/PartnerControls">
-  <documentManagement>
-    <Status xmlns="71af3243-3dd4-4a8d-8c0d-dd76da1f02a5">Not started</Status>
-    <MediaServiceKeyPoints xmlns="71af3243-3dd4-4a8d-8c0d-dd76da1f02a5" xsi:nil="true"/>
-  </documentManagement>
-</p:properties>
 </file>
 
 <file path=customXml/item3.xml><?xml version="1.0" encoding="utf-8"?>
@@ -15145,14 +15652,6 @@
 </file>
 
 <file path=customXml/itemProps1.xml><?xml version="1.0" encoding="utf-8"?>
-<ds:datastoreItem xmlns:ds="http://schemas.openxmlformats.org/officeDocument/2006/customXml" ds:itemID="{7EE8C63A-4744-4DE4-BB49-0FF0B5375C60}">
-  <ds:schemaRefs>
-    <ds:schemaRef ds:uri="http://schemas.microsoft.com/sharepoint/v3/contenttype/forms"/>
-  </ds:schemaRefs>
-</ds:datastoreItem>
-</file>
-
-<file path=customXml/itemProps2.xml><?xml version="1.0" encoding="utf-8"?>
 <ds:datastoreItem xmlns:ds="http://schemas.openxmlformats.org/officeDocument/2006/customXml" ds:itemID="{950072C5-DDE0-4258-BA7A-4D4B80DFA632}">
   <ds:schemaRefs>
     <ds:schemaRef ds:uri="http://purl.org/dc/terms/"/>
@@ -15165,6 +15664,14 @@
     <ds:schemaRef ds:uri="http://schemas.microsoft.com/office/2006/metadata/properties"/>
     <ds:schemaRef ds:uri="http://www.w3.org/XML/1998/namespace"/>
     <ds:schemaRef ds:uri="http://purl.org/dc/dcmitype/"/>
+  </ds:schemaRefs>
+</ds:datastoreItem>
+</file>
+
+<file path=customXml/itemProps2.xml><?xml version="1.0" encoding="utf-8"?>
+<ds:datastoreItem xmlns:ds="http://schemas.openxmlformats.org/officeDocument/2006/customXml" ds:itemID="{7EE8C63A-4744-4DE4-BB49-0FF0B5375C60}">
+  <ds:schemaRefs>
+    <ds:schemaRef ds:uri="http://schemas.microsoft.com/sharepoint/v3/contenttype/forms"/>
   </ds:schemaRefs>
 </ds:datastoreItem>
 </file>

</xml_diff>